<commit_message>
Import alpha power during ERP testing data
Model selection,
</commit_message>
<xml_diff>
--- a/data analysis/alpha_SNR_2018-1-17.pptx
+++ b/data analysis/alpha_SNR_2018-1-17.pptx
@@ -5,7 +5,7 @@
     <p:sldMasterId id="2147483648" r:id="rId1"/>
   </p:sldMasterIdLst>
   <p:notesMasterIdLst>
-    <p:notesMasterId r:id="rId13"/>
+    <p:notesMasterId r:id="rId14"/>
   </p:notesMasterIdLst>
   <p:sldIdLst>
     <p:sldId id="256" r:id="rId2"/>
@@ -14,11 +14,12 @@
     <p:sldId id="263" r:id="rId5"/>
     <p:sldId id="276" r:id="rId6"/>
     <p:sldId id="271" r:id="rId7"/>
-    <p:sldId id="270" r:id="rId8"/>
-    <p:sldId id="272" r:id="rId9"/>
-    <p:sldId id="273" r:id="rId10"/>
-    <p:sldId id="274" r:id="rId11"/>
-    <p:sldId id="265" r:id="rId12"/>
+    <p:sldId id="277" r:id="rId8"/>
+    <p:sldId id="270" r:id="rId9"/>
+    <p:sldId id="272" r:id="rId10"/>
+    <p:sldId id="273" r:id="rId11"/>
+    <p:sldId id="274" r:id="rId12"/>
+    <p:sldId id="265" r:id="rId13"/>
   </p:sldIdLst>
   <p:sldSz cx="12192000" cy="6858000"/>
   <p:notesSz cx="6858000" cy="9144000"/>
@@ -128,6 +129,7 @@
             <p14:sldId id="263"/>
             <p14:sldId id="276"/>
             <p14:sldId id="271"/>
+            <p14:sldId id="277"/>
             <p14:sldId id="270"/>
             <p14:sldId id="272"/>
             <p14:sldId id="273"/>
@@ -229,7 +231,7 @@
           <a:p>
             <a:fld id="{7632A2B4-7209-462E-905F-37D9BF206B00}" type="datetimeFigureOut">
               <a:rPr lang="en-US" smtClean="0"/>
-              <a:t>1/17/2018</a:t>
+              <a:t>1/29/2018</a:t>
             </a:fld>
             <a:endParaRPr lang="en-US"/>
           </a:p>
@@ -712,7 +714,7 @@
           <a:p>
             <a:fld id="{6F81013B-5B06-4D28-96F1-D627B35C6F6A}" type="datetimeFigureOut">
               <a:rPr lang="en-US" smtClean="0"/>
-              <a:t>1/17/2018</a:t>
+              <a:t>1/29/2018</a:t>
             </a:fld>
             <a:endParaRPr lang="en-US"/>
           </a:p>
@@ -882,7 +884,7 @@
           <a:p>
             <a:fld id="{6F81013B-5B06-4D28-96F1-D627B35C6F6A}" type="datetimeFigureOut">
               <a:rPr lang="en-US" smtClean="0"/>
-              <a:t>1/17/2018</a:t>
+              <a:t>1/29/2018</a:t>
             </a:fld>
             <a:endParaRPr lang="en-US"/>
           </a:p>
@@ -1062,7 +1064,7 @@
           <a:p>
             <a:fld id="{6F81013B-5B06-4D28-96F1-D627B35C6F6A}" type="datetimeFigureOut">
               <a:rPr lang="en-US" smtClean="0"/>
-              <a:t>1/17/2018</a:t>
+              <a:t>1/29/2018</a:t>
             </a:fld>
             <a:endParaRPr lang="en-US"/>
           </a:p>
@@ -1232,7 +1234,7 @@
           <a:p>
             <a:fld id="{6F81013B-5B06-4D28-96F1-D627B35C6F6A}" type="datetimeFigureOut">
               <a:rPr lang="en-US" smtClean="0"/>
-              <a:t>1/17/2018</a:t>
+              <a:t>1/29/2018</a:t>
             </a:fld>
             <a:endParaRPr lang="en-US"/>
           </a:p>
@@ -1478,7 +1480,7 @@
           <a:p>
             <a:fld id="{6F81013B-5B06-4D28-96F1-D627B35C6F6A}" type="datetimeFigureOut">
               <a:rPr lang="en-US" smtClean="0"/>
-              <a:t>1/17/2018</a:t>
+              <a:t>1/29/2018</a:t>
             </a:fld>
             <a:endParaRPr lang="en-US"/>
           </a:p>
@@ -1710,7 +1712,7 @@
           <a:p>
             <a:fld id="{6F81013B-5B06-4D28-96F1-D627B35C6F6A}" type="datetimeFigureOut">
               <a:rPr lang="en-US" smtClean="0"/>
-              <a:t>1/17/2018</a:t>
+              <a:t>1/29/2018</a:t>
             </a:fld>
             <a:endParaRPr lang="en-US"/>
           </a:p>
@@ -2077,7 +2079,7 @@
           <a:p>
             <a:fld id="{6F81013B-5B06-4D28-96F1-D627B35C6F6A}" type="datetimeFigureOut">
               <a:rPr lang="en-US" smtClean="0"/>
-              <a:t>1/17/2018</a:t>
+              <a:t>1/29/2018</a:t>
             </a:fld>
             <a:endParaRPr lang="en-US"/>
           </a:p>
@@ -2195,7 +2197,7 @@
           <a:p>
             <a:fld id="{6F81013B-5B06-4D28-96F1-D627B35C6F6A}" type="datetimeFigureOut">
               <a:rPr lang="en-US" smtClean="0"/>
-              <a:t>1/17/2018</a:t>
+              <a:t>1/29/2018</a:t>
             </a:fld>
             <a:endParaRPr lang="en-US"/>
           </a:p>
@@ -2290,7 +2292,7 @@
           <a:p>
             <a:fld id="{6F81013B-5B06-4D28-96F1-D627B35C6F6A}" type="datetimeFigureOut">
               <a:rPr lang="en-US" smtClean="0"/>
-              <a:t>1/17/2018</a:t>
+              <a:t>1/29/2018</a:t>
             </a:fld>
             <a:endParaRPr lang="en-US"/>
           </a:p>
@@ -2567,7 +2569,7 @@
           <a:p>
             <a:fld id="{6F81013B-5B06-4D28-96F1-D627B35C6F6A}" type="datetimeFigureOut">
               <a:rPr lang="en-US" smtClean="0"/>
-              <a:t>1/17/2018</a:t>
+              <a:t>1/29/2018</a:t>
             </a:fld>
             <a:endParaRPr lang="en-US"/>
           </a:p>
@@ -2820,7 +2822,7 @@
           <a:p>
             <a:fld id="{6F81013B-5B06-4D28-96F1-D627B35C6F6A}" type="datetimeFigureOut">
               <a:rPr lang="en-US" smtClean="0"/>
-              <a:t>1/17/2018</a:t>
+              <a:t>1/29/2018</a:t>
             </a:fld>
             <a:endParaRPr lang="en-US"/>
           </a:p>
@@ -3033,7 +3035,7 @@
           <a:p>
             <a:fld id="{6F81013B-5B06-4D28-96F1-D627B35C6F6A}" type="datetimeFigureOut">
               <a:rPr lang="en-US" smtClean="0"/>
-              <a:t>1/17/2018</a:t>
+              <a:t>1/29/2018</a:t>
             </a:fld>
             <a:endParaRPr lang="en-US"/>
           </a:p>
@@ -3498,15 +3500,7 @@
           <a:p>
             <a:r>
               <a:rPr lang="en-US" dirty="0" smtClean="0"/>
-              <a:t>Participants (</a:t>
-            </a:r>
-            <a:r>
-              <a:rPr lang="en-US" dirty="0" smtClean="0"/>
-              <a:t>n=38): </a:t>
-            </a:r>
-            <a:r>
-              <a:rPr lang="en-US" dirty="0" smtClean="0"/>
-              <a:t>Mean age=65 (31-78). Mild to moderate hearing loss. Hearing aid users</a:t>
+              <a:t>Participants (n=38): Mean age=65 (31-78). Mild to moderate hearing loss. Hearing aid users</a:t>
             </a:r>
           </a:p>
           <a:p>
@@ -3808,6 +3802,188 @@
       </p:grpSpPr>
       <p:sp>
         <p:nvSpPr>
+          <p:cNvPr id="2" name="Title 1"/>
+          <p:cNvSpPr>
+            <a:spLocks noGrp="1"/>
+          </p:cNvSpPr>
+          <p:nvPr>
+            <p:ph type="title"/>
+          </p:nvPr>
+        </p:nvSpPr>
+        <p:spPr/>
+        <p:txBody>
+          <a:bodyPr/>
+          <a:lstStyle/>
+          <a:p>
+            <a:endParaRPr lang="en-US"/>
+          </a:p>
+        </p:txBody>
+      </p:sp>
+      <p:sp>
+        <p:nvSpPr>
+          <p:cNvPr id="3" name="Content Placeholder 2"/>
+          <p:cNvSpPr>
+            <a:spLocks noGrp="1"/>
+          </p:cNvSpPr>
+          <p:nvPr>
+            <p:ph idx="1"/>
+          </p:nvPr>
+        </p:nvSpPr>
+        <p:spPr/>
+        <p:txBody>
+          <a:bodyPr/>
+          <a:lstStyle/>
+          <a:p>
+            <a:endParaRPr lang="en-US"/>
+          </a:p>
+        </p:txBody>
+      </p:sp>
+      <p:pic>
+        <p:nvPicPr>
+          <p:cNvPr id="4" name="Picture 3"/>
+          <p:cNvPicPr>
+            <a:picLocks noChangeAspect="1"/>
+          </p:cNvPicPr>
+          <p:nvPr/>
+        </p:nvPicPr>
+        <p:blipFill>
+          <a:blip r:embed="rId2"/>
+          <a:stretch>
+            <a:fillRect/>
+          </a:stretch>
+        </p:blipFill>
+        <p:spPr>
+          <a:xfrm>
+            <a:off x="483315" y="0"/>
+            <a:ext cx="11225370" cy="6858000"/>
+          </a:xfrm>
+          <a:prstGeom prst="rect">
+            <a:avLst/>
+          </a:prstGeom>
+        </p:spPr>
+      </p:pic>
+      <p:sp>
+        <p:nvSpPr>
+          <p:cNvPr id="5" name="Rectangle 4"/>
+          <p:cNvSpPr/>
+          <p:nvPr/>
+        </p:nvSpPr>
+        <p:spPr>
+          <a:xfrm>
+            <a:off x="6335051" y="818579"/>
+            <a:ext cx="438912" cy="326009"/>
+          </a:xfrm>
+          <a:prstGeom prst="rect">
+            <a:avLst/>
+          </a:prstGeom>
+          <a:solidFill>
+            <a:srgbClr val="5B9BD5">
+              <a:alpha val="21176"/>
+            </a:srgbClr>
+          </a:solidFill>
+        </p:spPr>
+        <p:style>
+          <a:lnRef idx="2">
+            <a:schemeClr val="accent1">
+              <a:shade val="50000"/>
+            </a:schemeClr>
+          </a:lnRef>
+          <a:fillRef idx="1">
+            <a:schemeClr val="accent1"/>
+          </a:fillRef>
+          <a:effectRef idx="0">
+            <a:schemeClr val="accent1"/>
+          </a:effectRef>
+          <a:fontRef idx="minor">
+            <a:schemeClr val="lt1"/>
+          </a:fontRef>
+        </p:style>
+        <p:txBody>
+          <a:bodyPr rtlCol="0" anchor="ctr"/>
+          <a:lstStyle/>
+          <a:p>
+            <a:pPr algn="ctr"/>
+            <a:endParaRPr lang="en-US"/>
+          </a:p>
+        </p:txBody>
+      </p:sp>
+      <p:sp>
+        <p:nvSpPr>
+          <p:cNvPr id="6" name="Rectangle 5"/>
+          <p:cNvSpPr/>
+          <p:nvPr/>
+        </p:nvSpPr>
+        <p:spPr>
+          <a:xfrm>
+            <a:off x="9110908" y="547116"/>
+            <a:ext cx="438912" cy="326009"/>
+          </a:xfrm>
+          <a:prstGeom prst="rect">
+            <a:avLst/>
+          </a:prstGeom>
+          <a:solidFill>
+            <a:srgbClr val="5B9BD5">
+              <a:alpha val="21176"/>
+            </a:srgbClr>
+          </a:solidFill>
+        </p:spPr>
+        <p:style>
+          <a:lnRef idx="2">
+            <a:schemeClr val="accent1">
+              <a:shade val="50000"/>
+            </a:schemeClr>
+          </a:lnRef>
+          <a:fillRef idx="1">
+            <a:schemeClr val="accent1"/>
+          </a:fillRef>
+          <a:effectRef idx="0">
+            <a:schemeClr val="accent1"/>
+          </a:effectRef>
+          <a:fontRef idx="minor">
+            <a:schemeClr val="lt1"/>
+          </a:fontRef>
+        </p:style>
+        <p:txBody>
+          <a:bodyPr rtlCol="0" anchor="ctr"/>
+          <a:lstStyle/>
+          <a:p>
+            <a:pPr algn="ctr"/>
+            <a:endParaRPr lang="en-US"/>
+          </a:p>
+        </p:txBody>
+      </p:sp>
+    </p:spTree>
+    <p:extLst>
+      <p:ext uri="{BB962C8B-B14F-4D97-AF65-F5344CB8AC3E}">
+        <p14:creationId xmlns:p14="http://schemas.microsoft.com/office/powerpoint/2010/main" val="1971387436"/>
+      </p:ext>
+    </p:extLst>
+  </p:cSld>
+  <p:clrMapOvr>
+    <a:masterClrMapping/>
+  </p:clrMapOvr>
+</p:sld>
+</file>
+
+<file path=ppt/slides/slide11.xml><?xml version="1.0" encoding="utf-8"?>
+<p:sld xmlns:a="http://schemas.openxmlformats.org/drawingml/2006/main" xmlns:r="http://schemas.openxmlformats.org/officeDocument/2006/relationships" xmlns:p="http://schemas.openxmlformats.org/presentationml/2006/main">
+  <p:cSld>
+    <p:spTree>
+      <p:nvGrpSpPr>
+        <p:cNvPr id="1" name=""/>
+        <p:cNvGrpSpPr/>
+        <p:nvPr/>
+      </p:nvGrpSpPr>
+      <p:grpSpPr>
+        <a:xfrm>
+          <a:off x="0" y="0"/>
+          <a:ext cx="0" cy="0"/>
+          <a:chOff x="0" y="0"/>
+          <a:chExt cx="0" cy="0"/>
+        </a:xfrm>
+      </p:grpSpPr>
+      <p:sp>
+        <p:nvSpPr>
           <p:cNvPr id="7" name="TextBox 6"/>
           <p:cNvSpPr txBox="1"/>
           <p:nvPr/>
@@ -4707,31 +4883,8 @@
                 <a:effectLst/>
                 <a:latin typeface="Lucida Console" panose="020B0609040504020204" pitchFamily="49" charset="0"/>
               </a:rPr>
-              <a:t>aphab_unaided_019 0.08707 0.04803 1.813 </a:t>
-            </a:r>
-            <a:r>
-              <a:rPr kumimoji="0" lang="en-US" altLang="en-US" sz="1000" b="0" i="0" u="none" strike="noStrike" cap="none" normalizeH="0" baseline="0" dirty="0" smtClean="0">
-                <a:ln>
-                  <a:noFill/>
-                </a:ln>
-                <a:solidFill>
-                  <a:srgbClr val="000000"/>
-                </a:solidFill>
-                <a:effectLst/>
-                <a:latin typeface="Lucida Console" panose="020B0609040504020204" pitchFamily="49" charset="0"/>
-              </a:rPr>
-              <a:t>   0.1033 </a:t>
-            </a:r>
-            <a:endParaRPr kumimoji="0" lang="en-US" altLang="en-US" sz="1000" b="0" i="0" u="none" strike="noStrike" cap="none" normalizeH="0" baseline="0" dirty="0" smtClean="0">
-              <a:ln>
-                <a:noFill/>
-              </a:ln>
-              <a:solidFill>
-                <a:srgbClr val="000000"/>
-              </a:solidFill>
-              <a:effectLst/>
-              <a:latin typeface="Lucida Console" panose="020B0609040504020204" pitchFamily="49" charset="0"/>
-            </a:endParaRPr>
+              <a:t>aphab_unaided_019 0.08707 0.04803 1.813    0.1033 </a:t>
+            </a:r>
           </a:p>
           <a:p>
             <a:pPr marL="0" marR="0" lvl="0" indent="0" algn="l" defTabSz="914400" rtl="0" eaLnBrk="0" fontAlgn="base" latinLnBrk="0" hangingPunct="0">
@@ -4983,7 +5136,7 @@
 </p:sld>
 </file>
 
-<file path=ppt/slides/slide11.xml><?xml version="1.0" encoding="utf-8"?>
+<file path=ppt/slides/slide12.xml><?xml version="1.0" encoding="utf-8"?>
 <p:sld xmlns:a="http://schemas.openxmlformats.org/drawingml/2006/main" xmlns:r="http://schemas.openxmlformats.org/officeDocument/2006/relationships" xmlns:p="http://schemas.openxmlformats.org/presentationml/2006/main">
   <p:cSld>
     <p:spTree>
@@ -7000,6 +7153,618 @@
           </a:p>
         </p:txBody>
       </p:sp>
+      <p:sp>
+        <p:nvSpPr>
+          <p:cNvPr id="4" name="Rectangle 1"/>
+          <p:cNvSpPr>
+            <a:spLocks noChangeArrowheads="1"/>
+          </p:cNvSpPr>
+          <p:nvPr/>
+        </p:nvSpPr>
+        <p:spPr bwMode="auto">
+          <a:xfrm>
+            <a:off x="838200" y="913765"/>
+            <a:ext cx="6014450" cy="2308324"/>
+          </a:xfrm>
+          <a:prstGeom prst="rect">
+            <a:avLst/>
+          </a:prstGeom>
+          <a:solidFill>
+            <a:srgbClr val="FFFFFF"/>
+          </a:solidFill>
+          <a:ln>
+            <a:noFill/>
+          </a:ln>
+          <a:effectLst/>
+          <a:extLst>
+            <a:ext uri="{91240B29-F687-4F45-9708-019B960494DF}">
+              <a14:hiddenLine xmlns:a14="http://schemas.microsoft.com/office/drawing/2010/main" w="9525">
+                <a:solidFill>
+                  <a:schemeClr val="tx1"/>
+                </a:solidFill>
+                <a:miter lim="800000"/>
+                <a:headEnd/>
+                <a:tailEnd/>
+              </a14:hiddenLine>
+            </a:ext>
+            <a:ext uri="{AF507438-7753-43E0-B8FC-AC1667EBCBE1}">
+              <a14:hiddenEffects xmlns:a14="http://schemas.microsoft.com/office/drawing/2010/main">
+                <a:effectLst>
+                  <a:outerShdw dist="35921" dir="2700000" algn="ctr" rotWithShape="0">
+                    <a:schemeClr val="bg2"/>
+                  </a:outerShdw>
+                </a:effectLst>
+              </a14:hiddenEffects>
+            </a:ext>
+          </a:extLst>
+        </p:spPr>
+        <p:txBody>
+          <a:bodyPr vert="horz" wrap="square" lIns="0" tIns="0" rIns="0" bIns="0" numCol="1" anchor="ctr" anchorCtr="0" compatLnSpc="1">
+            <a:prstTxWarp prst="textNoShape">
+              <a:avLst/>
+            </a:prstTxWarp>
+            <a:spAutoFit/>
+          </a:bodyPr>
+          <a:lstStyle/>
+          <a:p>
+            <a:pPr marL="0" marR="0" lvl="0" indent="0" algn="l" defTabSz="914400" rtl="0" eaLnBrk="0" fontAlgn="base" latinLnBrk="0" hangingPunct="0">
+              <a:lnSpc>
+                <a:spcPct val="100000"/>
+              </a:lnSpc>
+              <a:spcBef>
+                <a:spcPct val="0"/>
+              </a:spcBef>
+              <a:spcAft>
+                <a:spcPct val="0"/>
+              </a:spcAft>
+              <a:buClrTx/>
+              <a:buSzTx/>
+              <a:buFontTx/>
+              <a:buNone/>
+              <a:tabLst/>
+            </a:pPr>
+            <a:r>
+              <a:rPr kumimoji="0" lang="en-US" altLang="en-US" sz="1000" b="0" i="0" u="none" strike="noStrike" cap="none" normalizeH="0" baseline="0" dirty="0" smtClean="0">
+                <a:ln>
+                  <a:noFill/>
+                </a:ln>
+                <a:solidFill>
+                  <a:srgbClr val="000000"/>
+                </a:solidFill>
+                <a:effectLst/>
+                <a:latin typeface="Lucida Console" panose="020B0609040504020204" pitchFamily="49" charset="0"/>
+              </a:rPr>
+              <a:t>lm(formula = </a:t>
+            </a:r>
+            <a:r>
+              <a:rPr kumimoji="0" lang="en-US" altLang="en-US" sz="1000" b="0" i="0" u="none" strike="noStrike" cap="none" normalizeH="0" baseline="0" dirty="0" err="1" smtClean="0">
+                <a:ln>
+                  <a:noFill/>
+                </a:ln>
+                <a:solidFill>
+                  <a:srgbClr val="000000"/>
+                </a:solidFill>
+                <a:effectLst/>
+                <a:latin typeface="Lucida Console" panose="020B0609040504020204" pitchFamily="49" charset="0"/>
+              </a:rPr>
+              <a:t>alpha_power_peak_ratio</a:t>
+            </a:r>
+            <a:r>
+              <a:rPr kumimoji="0" lang="en-US" altLang="en-US" sz="1000" b="0" i="0" u="none" strike="noStrike" cap="none" normalizeH="0" baseline="0" dirty="0" smtClean="0">
+                <a:ln>
+                  <a:noFill/>
+                </a:ln>
+                <a:solidFill>
+                  <a:srgbClr val="000000"/>
+                </a:solidFill>
+                <a:effectLst/>
+                <a:latin typeface="Lucida Console" panose="020B0609040504020204" pitchFamily="49" charset="0"/>
+              </a:rPr>
+              <a:t> ~ SSQ2, data = </a:t>
+            </a:r>
+            <a:r>
+              <a:rPr kumimoji="0" lang="en-US" altLang="en-US" sz="1000" b="0" i="0" u="none" strike="noStrike" cap="none" normalizeH="0" baseline="0" dirty="0" err="1" smtClean="0">
+                <a:ln>
+                  <a:noFill/>
+                </a:ln>
+                <a:solidFill>
+                  <a:srgbClr val="000000"/>
+                </a:solidFill>
+                <a:effectLst/>
+                <a:latin typeface="Lucida Console" panose="020B0609040504020204" pitchFamily="49" charset="0"/>
+              </a:rPr>
+              <a:t>all_data</a:t>
+            </a:r>
+            <a:r>
+              <a:rPr kumimoji="0" lang="en-US" altLang="en-US" sz="1000" b="0" i="0" u="none" strike="noStrike" cap="none" normalizeH="0" baseline="0" dirty="0" smtClean="0">
+                <a:ln>
+                  <a:noFill/>
+                </a:ln>
+                <a:solidFill>
+                  <a:srgbClr val="000000"/>
+                </a:solidFill>
+                <a:effectLst/>
+                <a:latin typeface="Lucida Console" panose="020B0609040504020204" pitchFamily="49" charset="0"/>
+              </a:rPr>
+              <a:t>) </a:t>
+            </a:r>
+          </a:p>
+          <a:p>
+            <a:pPr marL="0" marR="0" lvl="0" indent="0" algn="l" defTabSz="914400" rtl="0" eaLnBrk="0" fontAlgn="base" latinLnBrk="0" hangingPunct="0">
+              <a:lnSpc>
+                <a:spcPct val="100000"/>
+              </a:lnSpc>
+              <a:spcBef>
+                <a:spcPct val="0"/>
+              </a:spcBef>
+              <a:spcAft>
+                <a:spcPct val="0"/>
+              </a:spcAft>
+              <a:buClrTx/>
+              <a:buSzTx/>
+              <a:buFontTx/>
+              <a:buNone/>
+              <a:tabLst/>
+            </a:pPr>
+            <a:endParaRPr lang="en-US" altLang="en-US" sz="1000" dirty="0">
+              <a:solidFill>
+                <a:srgbClr val="000000"/>
+              </a:solidFill>
+              <a:latin typeface="Lucida Console" panose="020B0609040504020204" pitchFamily="49" charset="0"/>
+            </a:endParaRPr>
+          </a:p>
+          <a:p>
+            <a:pPr marL="0" marR="0" lvl="0" indent="0" algn="l" defTabSz="914400" rtl="0" eaLnBrk="0" fontAlgn="base" latinLnBrk="0" hangingPunct="0">
+              <a:lnSpc>
+                <a:spcPct val="100000"/>
+              </a:lnSpc>
+              <a:spcBef>
+                <a:spcPct val="0"/>
+              </a:spcBef>
+              <a:spcAft>
+                <a:spcPct val="0"/>
+              </a:spcAft>
+              <a:buClrTx/>
+              <a:buSzTx/>
+              <a:buFontTx/>
+              <a:buNone/>
+              <a:tabLst/>
+            </a:pPr>
+            <a:r>
+              <a:rPr kumimoji="0" lang="en-US" altLang="en-US" sz="1000" b="0" i="0" u="none" strike="noStrike" cap="none" normalizeH="0" baseline="0" dirty="0" smtClean="0">
+                <a:ln>
+                  <a:noFill/>
+                </a:ln>
+                <a:solidFill>
+                  <a:srgbClr val="000000"/>
+                </a:solidFill>
+                <a:effectLst/>
+                <a:latin typeface="Lucida Console" panose="020B0609040504020204" pitchFamily="49" charset="0"/>
+              </a:rPr>
+              <a:t>Residuals: </a:t>
+            </a:r>
+          </a:p>
+          <a:p>
+            <a:pPr marL="0" marR="0" lvl="0" indent="0" algn="l" defTabSz="914400" rtl="0" eaLnBrk="0" fontAlgn="base" latinLnBrk="0" hangingPunct="0">
+              <a:lnSpc>
+                <a:spcPct val="100000"/>
+              </a:lnSpc>
+              <a:spcBef>
+                <a:spcPct val="0"/>
+              </a:spcBef>
+              <a:spcAft>
+                <a:spcPct val="0"/>
+              </a:spcAft>
+              <a:buClrTx/>
+              <a:buSzTx/>
+              <a:buFontTx/>
+              <a:buNone/>
+              <a:tabLst/>
+            </a:pPr>
+            <a:r>
+              <a:rPr kumimoji="0" lang="en-US" altLang="en-US" sz="1000" b="0" i="0" u="none" strike="noStrike" cap="none" normalizeH="0" baseline="0" dirty="0" smtClean="0">
+                <a:ln>
+                  <a:noFill/>
+                </a:ln>
+                <a:solidFill>
+                  <a:srgbClr val="000000"/>
+                </a:solidFill>
+                <a:effectLst/>
+                <a:latin typeface="Lucida Console" panose="020B0609040504020204" pitchFamily="49" charset="0"/>
+              </a:rPr>
+              <a:t>Min 	1Q 	Median 	3Q 	Max </a:t>
+            </a:r>
+          </a:p>
+          <a:p>
+            <a:pPr marL="0" marR="0" lvl="0" indent="0" algn="l" defTabSz="914400" rtl="0" eaLnBrk="0" fontAlgn="base" latinLnBrk="0" hangingPunct="0">
+              <a:lnSpc>
+                <a:spcPct val="100000"/>
+              </a:lnSpc>
+              <a:spcBef>
+                <a:spcPct val="0"/>
+              </a:spcBef>
+              <a:spcAft>
+                <a:spcPct val="0"/>
+              </a:spcAft>
+              <a:buClrTx/>
+              <a:buSzTx/>
+              <a:buFontTx/>
+              <a:buNone/>
+              <a:tabLst/>
+            </a:pPr>
+            <a:r>
+              <a:rPr kumimoji="0" lang="en-US" altLang="en-US" sz="1000" b="0" i="0" u="none" strike="noStrike" cap="none" normalizeH="0" baseline="0" dirty="0" smtClean="0">
+                <a:ln>
+                  <a:noFill/>
+                </a:ln>
+                <a:solidFill>
+                  <a:srgbClr val="000000"/>
+                </a:solidFill>
+                <a:effectLst/>
+                <a:latin typeface="Lucida Console" panose="020B0609040504020204" pitchFamily="49" charset="0"/>
+              </a:rPr>
+              <a:t>-0.39029 	-0.13188 	0.01583 	0.12879 	0.49161 </a:t>
+            </a:r>
+          </a:p>
+          <a:p>
+            <a:pPr marL="0" marR="0" lvl="0" indent="0" algn="l" defTabSz="914400" rtl="0" eaLnBrk="0" fontAlgn="base" latinLnBrk="0" hangingPunct="0">
+              <a:lnSpc>
+                <a:spcPct val="100000"/>
+              </a:lnSpc>
+              <a:spcBef>
+                <a:spcPct val="0"/>
+              </a:spcBef>
+              <a:spcAft>
+                <a:spcPct val="0"/>
+              </a:spcAft>
+              <a:buClrTx/>
+              <a:buSzTx/>
+              <a:buFontTx/>
+              <a:buNone/>
+              <a:tabLst/>
+            </a:pPr>
+            <a:endParaRPr lang="en-US" altLang="en-US" sz="1000" dirty="0">
+              <a:solidFill>
+                <a:srgbClr val="000000"/>
+              </a:solidFill>
+              <a:latin typeface="Lucida Console" panose="020B0609040504020204" pitchFamily="49" charset="0"/>
+            </a:endParaRPr>
+          </a:p>
+          <a:p>
+            <a:pPr marL="0" marR="0" lvl="0" indent="0" algn="l" defTabSz="914400" rtl="0" eaLnBrk="0" fontAlgn="base" latinLnBrk="0" hangingPunct="0">
+              <a:lnSpc>
+                <a:spcPct val="100000"/>
+              </a:lnSpc>
+              <a:spcBef>
+                <a:spcPct val="0"/>
+              </a:spcBef>
+              <a:spcAft>
+                <a:spcPct val="0"/>
+              </a:spcAft>
+              <a:buClrTx/>
+              <a:buSzTx/>
+              <a:buFontTx/>
+              <a:buNone/>
+              <a:tabLst/>
+            </a:pPr>
+            <a:r>
+              <a:rPr kumimoji="0" lang="en-US" altLang="en-US" sz="1000" b="0" i="0" u="none" strike="noStrike" cap="none" normalizeH="0" baseline="0" dirty="0" smtClean="0">
+                <a:ln>
+                  <a:noFill/>
+                </a:ln>
+                <a:solidFill>
+                  <a:srgbClr val="000000"/>
+                </a:solidFill>
+                <a:effectLst/>
+                <a:latin typeface="Lucida Console" panose="020B0609040504020204" pitchFamily="49" charset="0"/>
+              </a:rPr>
+              <a:t>Coefficients: </a:t>
+            </a:r>
+          </a:p>
+          <a:p>
+            <a:pPr marL="0" marR="0" lvl="0" indent="0" algn="l" defTabSz="914400" rtl="0" eaLnBrk="0" fontAlgn="base" latinLnBrk="0" hangingPunct="0">
+              <a:lnSpc>
+                <a:spcPct val="100000"/>
+              </a:lnSpc>
+              <a:spcBef>
+                <a:spcPct val="0"/>
+              </a:spcBef>
+              <a:spcAft>
+                <a:spcPct val="0"/>
+              </a:spcAft>
+              <a:buClrTx/>
+              <a:buSzTx/>
+              <a:buFontTx/>
+              <a:buNone/>
+              <a:tabLst/>
+            </a:pPr>
+            <a:endParaRPr lang="en-US" altLang="en-US" sz="1000" dirty="0">
+              <a:solidFill>
+                <a:srgbClr val="000000"/>
+              </a:solidFill>
+              <a:latin typeface="Lucida Console" panose="020B0609040504020204" pitchFamily="49" charset="0"/>
+            </a:endParaRPr>
+          </a:p>
+          <a:p>
+            <a:pPr marL="0" marR="0" lvl="0" indent="0" algn="l" defTabSz="914400" rtl="0" eaLnBrk="0" fontAlgn="base" latinLnBrk="0" hangingPunct="0">
+              <a:lnSpc>
+                <a:spcPct val="100000"/>
+              </a:lnSpc>
+              <a:spcBef>
+                <a:spcPct val="0"/>
+              </a:spcBef>
+              <a:spcAft>
+                <a:spcPct val="0"/>
+              </a:spcAft>
+              <a:buClrTx/>
+              <a:buSzTx/>
+              <a:buFontTx/>
+              <a:buNone/>
+              <a:tabLst/>
+            </a:pPr>
+            <a:r>
+              <a:rPr kumimoji="0" lang="en-US" altLang="en-US" sz="1000" b="0" i="0" u="none" strike="noStrike" cap="none" normalizeH="0" baseline="0" dirty="0" smtClean="0">
+                <a:ln>
+                  <a:noFill/>
+                </a:ln>
+                <a:solidFill>
+                  <a:srgbClr val="000000"/>
+                </a:solidFill>
+                <a:effectLst/>
+                <a:latin typeface="Lucida Console" panose="020B0609040504020204" pitchFamily="49" charset="0"/>
+              </a:rPr>
+              <a:t>	Estimate 	Std. Error 	t value 	</a:t>
+            </a:r>
+            <a:r>
+              <a:rPr kumimoji="0" lang="en-US" altLang="en-US" sz="1000" b="0" i="0" u="none" strike="noStrike" cap="none" normalizeH="0" baseline="0" dirty="0" err="1" smtClean="0">
+                <a:ln>
+                  <a:noFill/>
+                </a:ln>
+                <a:solidFill>
+                  <a:srgbClr val="000000"/>
+                </a:solidFill>
+                <a:effectLst/>
+                <a:latin typeface="Lucida Console" panose="020B0609040504020204" pitchFamily="49" charset="0"/>
+              </a:rPr>
+              <a:t>Pr</a:t>
+            </a:r>
+            <a:r>
+              <a:rPr kumimoji="0" lang="en-US" altLang="en-US" sz="1000" b="0" i="0" u="none" strike="noStrike" cap="none" normalizeH="0" baseline="0" dirty="0" smtClean="0">
+                <a:ln>
+                  <a:noFill/>
+                </a:ln>
+                <a:solidFill>
+                  <a:srgbClr val="000000"/>
+                </a:solidFill>
+                <a:effectLst/>
+                <a:latin typeface="Lucida Console" panose="020B0609040504020204" pitchFamily="49" charset="0"/>
+              </a:rPr>
+              <a:t>(&gt;|t|) </a:t>
+            </a:r>
+          </a:p>
+          <a:p>
+            <a:pPr marL="0" marR="0" lvl="0" indent="0" algn="l" defTabSz="914400" rtl="0" eaLnBrk="0" fontAlgn="base" latinLnBrk="0" hangingPunct="0">
+              <a:lnSpc>
+                <a:spcPct val="100000"/>
+              </a:lnSpc>
+              <a:spcBef>
+                <a:spcPct val="0"/>
+              </a:spcBef>
+              <a:spcAft>
+                <a:spcPct val="0"/>
+              </a:spcAft>
+              <a:buClrTx/>
+              <a:buSzTx/>
+              <a:buFontTx/>
+              <a:buNone/>
+              <a:tabLst/>
+            </a:pPr>
+            <a:r>
+              <a:rPr kumimoji="0" lang="en-US" altLang="en-US" sz="1000" b="0" i="0" u="none" strike="noStrike" cap="none" normalizeH="0" baseline="0" dirty="0" smtClean="0">
+                <a:ln>
+                  <a:noFill/>
+                </a:ln>
+                <a:solidFill>
+                  <a:srgbClr val="000000"/>
+                </a:solidFill>
+                <a:effectLst/>
+                <a:latin typeface="Lucida Console" panose="020B0609040504020204" pitchFamily="49" charset="0"/>
+              </a:rPr>
+              <a:t>(Intercept) 0.761527 	0.108139 	7.042 	3.95e-08 *** </a:t>
+            </a:r>
+          </a:p>
+          <a:p>
+            <a:pPr marL="0" marR="0" lvl="0" indent="0" algn="l" defTabSz="914400" rtl="0" eaLnBrk="0" fontAlgn="base" latinLnBrk="0" hangingPunct="0">
+              <a:lnSpc>
+                <a:spcPct val="100000"/>
+              </a:lnSpc>
+              <a:spcBef>
+                <a:spcPct val="0"/>
+              </a:spcBef>
+              <a:spcAft>
+                <a:spcPct val="0"/>
+              </a:spcAft>
+              <a:buClrTx/>
+              <a:buSzTx/>
+              <a:buFontTx/>
+              <a:buNone/>
+              <a:tabLst/>
+            </a:pPr>
+            <a:r>
+              <a:rPr kumimoji="0" lang="en-US" altLang="en-US" sz="1000" b="0" i="0" u="none" strike="noStrike" cap="none" normalizeH="0" baseline="0" dirty="0" smtClean="0">
+                <a:ln>
+                  <a:noFill/>
+                </a:ln>
+                <a:solidFill>
+                  <a:srgbClr val="000000"/>
+                </a:solidFill>
+                <a:effectLst/>
+                <a:latin typeface="Lucida Console" panose="020B0609040504020204" pitchFamily="49" charset="0"/>
+              </a:rPr>
+              <a:t>SSQ2 	-0.003667 	0.001652 	-2.220 	0.0332 * </a:t>
+            </a:r>
+          </a:p>
+          <a:p>
+            <a:pPr marL="0" marR="0" lvl="0" indent="0" algn="l" defTabSz="914400" rtl="0" eaLnBrk="0" fontAlgn="base" latinLnBrk="0" hangingPunct="0">
+              <a:lnSpc>
+                <a:spcPct val="100000"/>
+              </a:lnSpc>
+              <a:spcBef>
+                <a:spcPct val="0"/>
+              </a:spcBef>
+              <a:spcAft>
+                <a:spcPct val="0"/>
+              </a:spcAft>
+              <a:buClrTx/>
+              <a:buSzTx/>
+              <a:buFontTx/>
+              <a:buNone/>
+              <a:tabLst/>
+            </a:pPr>
+            <a:endParaRPr lang="en-US" altLang="en-US" sz="1000" dirty="0">
+              <a:solidFill>
+                <a:srgbClr val="000000"/>
+              </a:solidFill>
+              <a:latin typeface="Lucida Console" panose="020B0609040504020204" pitchFamily="49" charset="0"/>
+            </a:endParaRPr>
+          </a:p>
+          <a:p>
+            <a:pPr marL="0" marR="0" lvl="0" indent="0" algn="l" defTabSz="914400" rtl="0" eaLnBrk="0" fontAlgn="base" latinLnBrk="0" hangingPunct="0">
+              <a:lnSpc>
+                <a:spcPct val="100000"/>
+              </a:lnSpc>
+              <a:spcBef>
+                <a:spcPct val="0"/>
+              </a:spcBef>
+              <a:spcAft>
+                <a:spcPct val="0"/>
+              </a:spcAft>
+              <a:buClrTx/>
+              <a:buSzTx/>
+              <a:buFontTx/>
+              <a:buNone/>
+              <a:tabLst/>
+            </a:pPr>
+            <a:r>
+              <a:rPr kumimoji="0" lang="en-US" altLang="en-US" sz="1000" b="0" i="0" u="none" strike="noStrike" cap="none" normalizeH="0" baseline="0" dirty="0" smtClean="0">
+                <a:ln>
+                  <a:noFill/>
+                </a:ln>
+                <a:solidFill>
+                  <a:srgbClr val="000000"/>
+                </a:solidFill>
+                <a:effectLst/>
+                <a:latin typeface="Lucida Console" panose="020B0609040504020204" pitchFamily="49" charset="0"/>
+              </a:rPr>
+              <a:t>--- </a:t>
+            </a:r>
+            <a:r>
+              <a:rPr kumimoji="0" lang="en-US" altLang="en-US" sz="1000" b="0" i="0" u="none" strike="noStrike" cap="none" normalizeH="0" baseline="0" dirty="0" err="1" smtClean="0">
+                <a:ln>
+                  <a:noFill/>
+                </a:ln>
+                <a:solidFill>
+                  <a:srgbClr val="000000"/>
+                </a:solidFill>
+                <a:effectLst/>
+                <a:latin typeface="Lucida Console" panose="020B0609040504020204" pitchFamily="49" charset="0"/>
+              </a:rPr>
+              <a:t>Signif</a:t>
+            </a:r>
+            <a:r>
+              <a:rPr kumimoji="0" lang="en-US" altLang="en-US" sz="1000" b="0" i="0" u="none" strike="noStrike" cap="none" normalizeH="0" baseline="0" dirty="0" smtClean="0">
+                <a:ln>
+                  <a:noFill/>
+                </a:ln>
+                <a:solidFill>
+                  <a:srgbClr val="000000"/>
+                </a:solidFill>
+                <a:effectLst/>
+                <a:latin typeface="Lucida Console" panose="020B0609040504020204" pitchFamily="49" charset="0"/>
+              </a:rPr>
+              <a:t>. codes: 0 ‘***’ 0.001 ‘**’ 0.01 ‘*’ 0.05 ‘.’ 0.1 ‘ ’ 1 Residual standard error: 0.2153 on 34 degrees of freedom Multiple R-squared: 0.1266, Adjusted R-squared: 0.1009 F-statistic: 4.93 on 1 and 34 DF, p-value: 0.03316</a:t>
+            </a:r>
+            <a:endParaRPr kumimoji="0" lang="en-US" altLang="en-US" sz="1800" b="0" i="0" u="none" strike="noStrike" cap="none" normalizeH="0" baseline="0" dirty="0" smtClean="0">
+              <a:ln>
+                <a:noFill/>
+              </a:ln>
+              <a:solidFill>
+                <a:schemeClr val="tx1"/>
+              </a:solidFill>
+              <a:effectLst/>
+              <a:latin typeface="Arial" panose="020B0604020202020204" pitchFamily="34" charset="0"/>
+            </a:endParaRPr>
+          </a:p>
+        </p:txBody>
+      </p:sp>
+    </p:spTree>
+    <p:extLst>
+      <p:ext uri="{BB962C8B-B14F-4D97-AF65-F5344CB8AC3E}">
+        <p14:creationId xmlns:p14="http://schemas.microsoft.com/office/powerpoint/2010/main" val="1356411791"/>
+      </p:ext>
+    </p:extLst>
+  </p:cSld>
+  <p:clrMapOvr>
+    <a:masterClrMapping/>
+  </p:clrMapOvr>
+</p:sld>
+</file>
+
+<file path=ppt/slides/slide8.xml><?xml version="1.0" encoding="utf-8"?>
+<p:sld xmlns:a="http://schemas.openxmlformats.org/drawingml/2006/main" xmlns:r="http://schemas.openxmlformats.org/officeDocument/2006/relationships" xmlns:p="http://schemas.openxmlformats.org/presentationml/2006/main">
+  <p:cSld>
+    <p:spTree>
+      <p:nvGrpSpPr>
+        <p:cNvPr id="1" name=""/>
+        <p:cNvGrpSpPr/>
+        <p:nvPr/>
+      </p:nvGrpSpPr>
+      <p:grpSpPr>
+        <a:xfrm>
+          <a:off x="0" y="0"/>
+          <a:ext cx="0" cy="0"/>
+          <a:chOff x="0" y="0"/>
+          <a:chExt cx="0" cy="0"/>
+        </a:xfrm>
+      </p:grpSpPr>
+      <p:sp>
+        <p:nvSpPr>
+          <p:cNvPr id="2" name="Title 1"/>
+          <p:cNvSpPr>
+            <a:spLocks noGrp="1"/>
+          </p:cNvSpPr>
+          <p:nvPr>
+            <p:ph type="title"/>
+          </p:nvPr>
+        </p:nvSpPr>
+        <p:spPr/>
+        <p:txBody>
+          <a:bodyPr/>
+          <a:lstStyle/>
+          <a:p>
+            <a:endParaRPr lang="en-US"/>
+          </a:p>
+        </p:txBody>
+      </p:sp>
+      <p:sp>
+        <p:nvSpPr>
+          <p:cNvPr id="3" name="Content Placeholder 2"/>
+          <p:cNvSpPr>
+            <a:spLocks noGrp="1"/>
+          </p:cNvSpPr>
+          <p:nvPr>
+            <p:ph idx="1"/>
+          </p:nvPr>
+        </p:nvSpPr>
+        <p:spPr/>
+        <p:txBody>
+          <a:bodyPr/>
+          <a:lstStyle/>
+          <a:p>
+            <a:endParaRPr lang="en-US"/>
+          </a:p>
+        </p:txBody>
+      </p:sp>
       <p:pic>
         <p:nvPicPr>
           <p:cNvPr id="4" name="Picture 3"/>
@@ -7116,7 +7881,7 @@
 </p:sld>
 </file>
 
-<file path=ppt/slides/slide8.xml><?xml version="1.0" encoding="utf-8"?>
+<file path=ppt/slides/slide9.xml><?xml version="1.0" encoding="utf-8"?>
 <p:sld xmlns:a="http://schemas.openxmlformats.org/drawingml/2006/main" xmlns:r="http://schemas.openxmlformats.org/officeDocument/2006/relationships" xmlns:p="http://schemas.openxmlformats.org/presentationml/2006/main">
   <p:cSld>
     <p:spTree>
@@ -7691,188 +8456,6 @@
     <p:extLst>
       <p:ext uri="{BB962C8B-B14F-4D97-AF65-F5344CB8AC3E}">
         <p14:creationId xmlns:p14="http://schemas.microsoft.com/office/powerpoint/2010/main" val="3681922557"/>
-      </p:ext>
-    </p:extLst>
-  </p:cSld>
-  <p:clrMapOvr>
-    <a:masterClrMapping/>
-  </p:clrMapOvr>
-</p:sld>
-</file>
-
-<file path=ppt/slides/slide9.xml><?xml version="1.0" encoding="utf-8"?>
-<p:sld xmlns:a="http://schemas.openxmlformats.org/drawingml/2006/main" xmlns:r="http://schemas.openxmlformats.org/officeDocument/2006/relationships" xmlns:p="http://schemas.openxmlformats.org/presentationml/2006/main">
-  <p:cSld>
-    <p:spTree>
-      <p:nvGrpSpPr>
-        <p:cNvPr id="1" name=""/>
-        <p:cNvGrpSpPr/>
-        <p:nvPr/>
-      </p:nvGrpSpPr>
-      <p:grpSpPr>
-        <a:xfrm>
-          <a:off x="0" y="0"/>
-          <a:ext cx="0" cy="0"/>
-          <a:chOff x="0" y="0"/>
-          <a:chExt cx="0" cy="0"/>
-        </a:xfrm>
-      </p:grpSpPr>
-      <p:sp>
-        <p:nvSpPr>
-          <p:cNvPr id="2" name="Title 1"/>
-          <p:cNvSpPr>
-            <a:spLocks noGrp="1"/>
-          </p:cNvSpPr>
-          <p:nvPr>
-            <p:ph type="title"/>
-          </p:nvPr>
-        </p:nvSpPr>
-        <p:spPr/>
-        <p:txBody>
-          <a:bodyPr/>
-          <a:lstStyle/>
-          <a:p>
-            <a:endParaRPr lang="en-US"/>
-          </a:p>
-        </p:txBody>
-      </p:sp>
-      <p:sp>
-        <p:nvSpPr>
-          <p:cNvPr id="3" name="Content Placeholder 2"/>
-          <p:cNvSpPr>
-            <a:spLocks noGrp="1"/>
-          </p:cNvSpPr>
-          <p:nvPr>
-            <p:ph idx="1"/>
-          </p:nvPr>
-        </p:nvSpPr>
-        <p:spPr/>
-        <p:txBody>
-          <a:bodyPr/>
-          <a:lstStyle/>
-          <a:p>
-            <a:endParaRPr lang="en-US"/>
-          </a:p>
-        </p:txBody>
-      </p:sp>
-      <p:pic>
-        <p:nvPicPr>
-          <p:cNvPr id="4" name="Picture 3"/>
-          <p:cNvPicPr>
-            <a:picLocks noChangeAspect="1"/>
-          </p:cNvPicPr>
-          <p:nvPr/>
-        </p:nvPicPr>
-        <p:blipFill>
-          <a:blip r:embed="rId2"/>
-          <a:stretch>
-            <a:fillRect/>
-          </a:stretch>
-        </p:blipFill>
-        <p:spPr>
-          <a:xfrm>
-            <a:off x="483315" y="0"/>
-            <a:ext cx="11225370" cy="6858000"/>
-          </a:xfrm>
-          <a:prstGeom prst="rect">
-            <a:avLst/>
-          </a:prstGeom>
-        </p:spPr>
-      </p:pic>
-      <p:sp>
-        <p:nvSpPr>
-          <p:cNvPr id="5" name="Rectangle 4"/>
-          <p:cNvSpPr/>
-          <p:nvPr/>
-        </p:nvSpPr>
-        <p:spPr>
-          <a:xfrm>
-            <a:off x="6335051" y="818579"/>
-            <a:ext cx="438912" cy="326009"/>
-          </a:xfrm>
-          <a:prstGeom prst="rect">
-            <a:avLst/>
-          </a:prstGeom>
-          <a:solidFill>
-            <a:srgbClr val="5B9BD5">
-              <a:alpha val="21176"/>
-            </a:srgbClr>
-          </a:solidFill>
-        </p:spPr>
-        <p:style>
-          <a:lnRef idx="2">
-            <a:schemeClr val="accent1">
-              <a:shade val="50000"/>
-            </a:schemeClr>
-          </a:lnRef>
-          <a:fillRef idx="1">
-            <a:schemeClr val="accent1"/>
-          </a:fillRef>
-          <a:effectRef idx="0">
-            <a:schemeClr val="accent1"/>
-          </a:effectRef>
-          <a:fontRef idx="minor">
-            <a:schemeClr val="lt1"/>
-          </a:fontRef>
-        </p:style>
-        <p:txBody>
-          <a:bodyPr rtlCol="0" anchor="ctr"/>
-          <a:lstStyle/>
-          <a:p>
-            <a:pPr algn="ctr"/>
-            <a:endParaRPr lang="en-US"/>
-          </a:p>
-        </p:txBody>
-      </p:sp>
-      <p:sp>
-        <p:nvSpPr>
-          <p:cNvPr id="6" name="Rectangle 5"/>
-          <p:cNvSpPr/>
-          <p:nvPr/>
-        </p:nvSpPr>
-        <p:spPr>
-          <a:xfrm>
-            <a:off x="9110908" y="547116"/>
-            <a:ext cx="438912" cy="326009"/>
-          </a:xfrm>
-          <a:prstGeom prst="rect">
-            <a:avLst/>
-          </a:prstGeom>
-          <a:solidFill>
-            <a:srgbClr val="5B9BD5">
-              <a:alpha val="21176"/>
-            </a:srgbClr>
-          </a:solidFill>
-        </p:spPr>
-        <p:style>
-          <a:lnRef idx="2">
-            <a:schemeClr val="accent1">
-              <a:shade val="50000"/>
-            </a:schemeClr>
-          </a:lnRef>
-          <a:fillRef idx="1">
-            <a:schemeClr val="accent1"/>
-          </a:fillRef>
-          <a:effectRef idx="0">
-            <a:schemeClr val="accent1"/>
-          </a:effectRef>
-          <a:fontRef idx="minor">
-            <a:schemeClr val="lt1"/>
-          </a:fontRef>
-        </p:style>
-        <p:txBody>
-          <a:bodyPr rtlCol="0" anchor="ctr"/>
-          <a:lstStyle/>
-          <a:p>
-            <a:pPr algn="ctr"/>
-            <a:endParaRPr lang="en-US"/>
-          </a:p>
-        </p:txBody>
-      </p:sp>
-    </p:spTree>
-    <p:extLst>
-      <p:ext uri="{BB962C8B-B14F-4D97-AF65-F5344CB8AC3E}">
-        <p14:creationId xmlns:p14="http://schemas.microsoft.com/office/powerpoint/2010/main" val="1971387436"/>
       </p:ext>
     </p:extLst>
   </p:cSld>

</xml_diff>